<commit_message>
Edit diagram to add "alt" for bottom part of diagram
</commit_message>
<xml_diff>
--- a/docs/diagrams/TagCommandSequenceDiagram.pptx
+++ b/docs/diagrams/TagCommandSequenceDiagram.pptx
@@ -3595,7 +3595,7 @@
         </p:nvSpPr>
         <p:spPr>
           <a:xfrm>
-            <a:off x="-533400" y="-304800"/>
+            <a:off x="-547518" y="-291400"/>
             <a:ext cx="12003895" cy="12940597"/>
           </a:xfrm>
           <a:prstGeom prst="roundRect">
@@ -5615,7 +5615,7 @@
         </p:nvSpPr>
         <p:spPr>
           <a:xfrm>
-            <a:off x="510979" y="2641942"/>
+            <a:off x="511016" y="2654209"/>
             <a:ext cx="457817" cy="369332"/>
           </a:xfrm>
           <a:prstGeom prst="rect">
@@ -6782,8 +6782,8 @@
         </p:nvSpPr>
         <p:spPr>
           <a:xfrm>
-            <a:off x="7872608" y="8380194"/>
-            <a:ext cx="5525954" cy="3697441"/>
+            <a:off x="7412836" y="8380194"/>
+            <a:ext cx="5985725" cy="3697441"/>
           </a:xfrm>
           <a:prstGeom prst="rect">
             <a:avLst/>
@@ -7497,8 +7497,8 @@
         </p:nvCxnSpPr>
         <p:spPr>
           <a:xfrm flipH="1">
-            <a:off x="7872608" y="11264200"/>
-            <a:ext cx="5525954" cy="0"/>
+            <a:off x="7412836" y="11264200"/>
+            <a:ext cx="5985726" cy="0"/>
           </a:xfrm>
           <a:prstGeom prst="line">
             <a:avLst/>
@@ -7779,6 +7779,91 @@
           </a:fontRef>
         </p:style>
       </p:cxnSp>
+      <p:sp>
+        <p:nvSpPr>
+          <p:cNvPr id="174" name="Snip Single Corner Rectangle 173">
+            <a:extLst>
+              <a:ext uri="{FF2B5EF4-FFF2-40B4-BE49-F238E27FC236}">
+                <a16:creationId xmlns:a16="http://schemas.microsoft.com/office/drawing/2014/main" id="{495A850B-339A-AE43-AB76-243A830C1A44}"/>
+              </a:ext>
+            </a:extLst>
+          </p:cNvPr>
+          <p:cNvSpPr/>
+          <p:nvPr/>
+        </p:nvSpPr>
+        <p:spPr>
+          <a:xfrm rot="5400000">
+            <a:off x="7528966" y="8291037"/>
+            <a:ext cx="321249" cy="553507"/>
+          </a:xfrm>
+          <a:prstGeom prst="snip1Rect">
+            <a:avLst/>
+          </a:prstGeom>
+        </p:spPr>
+        <p:style>
+          <a:lnRef idx="2">
+            <a:schemeClr val="accent1">
+              <a:shade val="50000"/>
+            </a:schemeClr>
+          </a:lnRef>
+          <a:fillRef idx="1">
+            <a:schemeClr val="accent1"/>
+          </a:fillRef>
+          <a:effectRef idx="0">
+            <a:schemeClr val="accent1"/>
+          </a:effectRef>
+          <a:fontRef idx="minor">
+            <a:schemeClr val="lt1"/>
+          </a:fontRef>
+        </p:style>
+        <p:txBody>
+          <a:bodyPr rtlCol="0" anchor="ctr"/>
+          <a:lstStyle/>
+          <a:p>
+            <a:pPr algn="ctr"/>
+            <a:endParaRPr lang="en-US" dirty="0"/>
+          </a:p>
+        </p:txBody>
+      </p:sp>
+      <p:sp>
+        <p:nvSpPr>
+          <p:cNvPr id="175" name="TextBox 174">
+            <a:extLst>
+              <a:ext uri="{FF2B5EF4-FFF2-40B4-BE49-F238E27FC236}">
+                <a16:creationId xmlns:a16="http://schemas.microsoft.com/office/drawing/2014/main" id="{7A5D3F2B-5115-A141-9707-1738FAC15672}"/>
+              </a:ext>
+            </a:extLst>
+          </p:cNvPr>
+          <p:cNvSpPr txBox="1"/>
+          <p:nvPr/>
+        </p:nvSpPr>
+        <p:spPr>
+          <a:xfrm>
+            <a:off x="7466226" y="8385266"/>
+            <a:ext cx="457817" cy="369332"/>
+          </a:xfrm>
+          <a:prstGeom prst="rect">
+            <a:avLst/>
+          </a:prstGeom>
+          <a:noFill/>
+        </p:spPr>
+        <p:txBody>
+          <a:bodyPr wrap="square" rtlCol="0">
+            <a:spAutoFit/>
+          </a:bodyPr>
+          <a:lstStyle/>
+          <a:p>
+            <a:r>
+              <a:rPr lang="en-US" dirty="0">
+                <a:solidFill>
+                  <a:schemeClr val="bg1"/>
+                </a:solidFill>
+              </a:rPr>
+              <a:t>alt</a:t>
+            </a:r>
+          </a:p>
+        </p:txBody>
+      </p:sp>
     </p:spTree>
     <p:extLst>
       <p:ext uri="{BB962C8B-B14F-4D97-AF65-F5344CB8AC3E}">

</xml_diff>

<commit_message>
Add return value from TagCommandParser
</commit_message>
<xml_diff>
--- a/docs/diagrams/TagCommandSequenceDiagram.pptx
+++ b/docs/diagrams/TagCommandSequenceDiagram.pptx
@@ -7860,6 +7860,52 @@
                 </a:solidFill>
               </a:rPr>
               <a:t>alt</a:t>
+            </a:r>
+          </a:p>
+        </p:txBody>
+      </p:sp>
+      <p:sp>
+        <p:nvSpPr>
+          <p:cNvPr id="177" name="TextBox 176">
+            <a:extLst>
+              <a:ext uri="{FF2B5EF4-FFF2-40B4-BE49-F238E27FC236}">
+                <a16:creationId xmlns:a16="http://schemas.microsoft.com/office/drawing/2014/main" id="{42F6969E-9CDE-624F-955B-913FEB16A5A0}"/>
+              </a:ext>
+            </a:extLst>
+          </p:cNvPr>
+          <p:cNvSpPr txBox="1"/>
+          <p:nvPr/>
+        </p:nvSpPr>
+        <p:spPr>
+          <a:xfrm>
+            <a:off x="4766093" y="7231913"/>
+            <a:ext cx="220343" cy="215444"/>
+          </a:xfrm>
+          <a:prstGeom prst="rect">
+            <a:avLst/>
+          </a:prstGeom>
+          <a:noFill/>
+        </p:spPr>
+        <p:txBody>
+          <a:bodyPr wrap="square" lIns="0" tIns="0" rIns="0" bIns="0" rtlCol="0">
+            <a:spAutoFit/>
+          </a:bodyPr>
+          <a:lstStyle>
+            <a:defPPr>
+              <a:defRPr lang="en-US"/>
+            </a:defPPr>
+            <a:lvl1pPr algn="r">
+              <a:defRPr sz="1400">
+                <a:solidFill>
+                  <a:srgbClr val="0070C0"/>
+                </a:solidFill>
+              </a:defRPr>
+            </a:lvl1pPr>
+          </a:lstStyle>
+          <a:p>
+            <a:r>
+              <a:rPr lang="en-US" dirty="0"/>
+              <a:t>t</a:t>
             </a:r>
           </a:p>
         </p:txBody>

</xml_diff>